<commit_message>
update the presentation slide
</commit_message>
<xml_diff>
--- a/team2_datathon_presentation.pptx
+++ b/team2_datathon_presentation.pptx
@@ -7,11 +7,6 @@
   <p:sldIdLst>
     <p:sldId id="256" r:id="rId2"/>
     <p:sldId id="257" r:id="rId3"/>
-    <p:sldId id="258" r:id="rId4"/>
-    <p:sldId id="259" r:id="rId5"/>
-    <p:sldId id="260" r:id="rId6"/>
-    <p:sldId id="261" r:id="rId7"/>
-    <p:sldId id="262" r:id="rId8"/>
   </p:sldIdLst>
   <p:sldSz cx="12192000" cy="6858000"/>
   <p:notesSz cx="6858000" cy="9144000"/>
@@ -110,6 +105,11 @@
       </a:defRPr>
     </a:lvl9pPr>
   </p:defaultTextStyle>
+  <p:extLst>
+    <p:ext uri="{EFAFB233-063F-42B5-8137-9DF3F51BA10A}">
+      <p15:sldGuideLst xmlns:p15="http://schemas.microsoft.com/office/powerpoint/2012/main"/>
+    </p:ext>
+  </p:extLst>
 </p:presentation>
 </file>
 
@@ -3834,14 +3834,23 @@
             </a:br>
             <a:r>
               <a:rPr lang="en-US" sz="4000" cap="none" dirty="0" smtClean="0"/>
-              <a:t>An analytics of medias </a:t>
-            </a:r>
-            <a:br>
+              <a:t>Analy</a:t>
+            </a:r>
+            <a:r>
               <a:rPr lang="en-US" sz="4000" cap="none" dirty="0" smtClean="0"/>
-            </a:br>
+              <a:t>si</a:t>
+            </a:r>
             <a:r>
               <a:rPr lang="en-US" sz="4000" cap="none" dirty="0" smtClean="0"/>
-              <a:t>on treating disaster issues</a:t>
+              <a:t>s </a:t>
+            </a:r>
+            <a:r>
+              <a:rPr lang="en-US" sz="4000" cap="none" dirty="0" smtClean="0"/>
+              <a:t>of </a:t>
+            </a:r>
+            <a:r>
+              <a:rPr lang="en-US" sz="4000" cap="none" dirty="0" smtClean="0"/>
+              <a:t>media reporting of disasters</a:t>
             </a:r>
             <a:endParaRPr lang="en-US" cap="none" dirty="0"/>
           </a:p>
@@ -3916,7 +3925,6 @@
               <a:rPr lang="en-US" dirty="0"/>
               <a:t> Han (KAIST)</a:t>
             </a:r>
-            <a:endParaRPr lang="en-US" dirty="0"/>
           </a:p>
         </p:txBody>
       </p:sp>
@@ -3974,7 +3982,7 @@
           <a:p>
             <a:r>
               <a:rPr lang="en-US" dirty="0" smtClean="0"/>
-              <a:t>Motivation &amp; Research question</a:t>
+              <a:t>Summary</a:t>
             </a:r>
             <a:endParaRPr lang="en-US" dirty="0"/>
           </a:p>
@@ -3993,49 +4001,15 @@
         <p:spPr/>
         <p:txBody>
           <a:bodyPr>
-            <a:normAutofit fontScale="92500" lnSpcReduction="20000"/>
+            <a:normAutofit/>
           </a:bodyPr>
           <a:lstStyle/>
           <a:p>
             <a:r>
               <a:rPr lang="en-US" dirty="0" smtClean="0"/>
-              <a:t>Motivation</a:t>
-            </a:r>
-          </a:p>
-          <a:p>
-            <a:pPr lvl="1"/>
-            <a:r>
-              <a:rPr lang="en-US" dirty="0" smtClean="0"/>
-              <a:t>Newspapers have their own </a:t>
-            </a:r>
-            <a:r>
-              <a:rPr lang="en-US" dirty="0" smtClean="0"/>
-              <a:t>editorial policy</a:t>
-            </a:r>
-          </a:p>
-          <a:p>
-            <a:pPr lvl="1"/>
-            <a:r>
-              <a:rPr lang="en-US" dirty="0" smtClean="0"/>
-              <a:t>By the editorial policy, the content and the attitude of news articles can be differed</a:t>
-            </a:r>
-          </a:p>
-          <a:p>
-            <a:pPr lvl="1"/>
-            <a:r>
-              <a:rPr lang="en-US" dirty="0" smtClean="0"/>
-              <a:t>We want to explore what disasters the UK medias are interest in and how the medias handle the disasters in their articles, especially in environmental disaster</a:t>
-            </a:r>
-          </a:p>
-          <a:p>
-            <a:pPr lvl="1"/>
+              <a:t>Goal</a:t>
+            </a:r>
             <a:endParaRPr lang="en-US" dirty="0" smtClean="0"/>
-          </a:p>
-          <a:p>
-            <a:r>
-              <a:rPr lang="en-US" dirty="0" smtClean="0"/>
-              <a:t>Research question</a:t>
-            </a:r>
           </a:p>
           <a:p>
             <a:pPr lvl="1"/>
@@ -4045,28 +4019,6 @@
             </a:r>
             <a:r>
               <a:rPr lang="en-US" dirty="0"/>
-              <a:t>to find the articles related to environmental </a:t>
-            </a:r>
-            <a:r>
-              <a:rPr lang="en-US" dirty="0" smtClean="0"/>
-              <a:t>disaster?</a:t>
-            </a:r>
-          </a:p>
-          <a:p>
-            <a:pPr marL="765175" lvl="2" indent="-342900"/>
-            <a:r>
-              <a:rPr lang="en-US" dirty="0" smtClean="0"/>
-              <a:t>We did an exploratory analysis and made some rules to select the disaster-related news</a:t>
-            </a:r>
-          </a:p>
-          <a:p>
-            <a:pPr lvl="1"/>
-            <a:r>
-              <a:rPr lang="en-US" dirty="0" smtClean="0"/>
-              <a:t>How </a:t>
-            </a:r>
-            <a:r>
-              <a:rPr lang="en-US" dirty="0"/>
               <a:t>to analyze the difference between how media report the same issues (e.g. environmental disaster</a:t>
             </a:r>
             <a:r>
@@ -4075,12 +4027,33 @@
             </a:r>
           </a:p>
           <a:p>
-            <a:pPr marL="804863" lvl="2" indent="-341313"/>
+            <a:pPr lvl="2"/>
+            <a:r>
+              <a:rPr lang="en-US" sz="2000" dirty="0" smtClean="0"/>
+              <a:t>Method</a:t>
+            </a:r>
+          </a:p>
+          <a:p>
+            <a:pPr lvl="3"/>
             <a:r>
               <a:rPr lang="en-US" dirty="0" smtClean="0"/>
-              <a:t>We performed topic modelling and sentiment analysis on the disaster-related news</a:t>
-            </a:r>
-            <a:endParaRPr lang="en-US" dirty="0"/>
+              <a:t>Exploratory analysis</a:t>
+            </a:r>
+          </a:p>
+          <a:p>
+            <a:pPr lvl="3"/>
+            <a:r>
+              <a:rPr lang="en-US" dirty="0" smtClean="0"/>
+              <a:t>LDA (topic modelling)</a:t>
+            </a:r>
+          </a:p>
+          <a:p>
+            <a:pPr lvl="3"/>
+            <a:r>
+              <a:rPr lang="en-US" dirty="0" smtClean="0"/>
+              <a:t>Sentiment analysis</a:t>
+            </a:r>
+            <a:endParaRPr lang="en-US" dirty="0" smtClean="0"/>
           </a:p>
         </p:txBody>
       </p:sp>
@@ -4088,585 +4061,6 @@
     <p:extLst>
       <p:ext uri="{BB962C8B-B14F-4D97-AF65-F5344CB8AC3E}">
         <p14:creationId xmlns:p14="http://schemas.microsoft.com/office/powerpoint/2010/main" val="140883548"/>
-      </p:ext>
-    </p:extLst>
-  </p:cSld>
-  <p:clrMapOvr>
-    <a:masterClrMapping/>
-  </p:clrMapOvr>
-  <p:timing>
-    <p:tnLst>
-      <p:par>
-        <p:cTn id="1" dur="indefinite" restart="never" nodeType="tmRoot"/>
-      </p:par>
-    </p:tnLst>
-  </p:timing>
-</p:sld>
-</file>
-
-<file path=ppt/slides/slide3.xml><?xml version="1.0" encoding="utf-8"?>
-<p:sld xmlns:a="http://schemas.openxmlformats.org/drawingml/2006/main" xmlns:r="http://schemas.openxmlformats.org/officeDocument/2006/relationships" xmlns:p="http://schemas.openxmlformats.org/presentationml/2006/main">
-  <p:cSld>
-    <p:spTree>
-      <p:nvGrpSpPr>
-        <p:cNvPr id="1" name=""/>
-        <p:cNvGrpSpPr/>
-        <p:nvPr/>
-      </p:nvGrpSpPr>
-      <p:grpSpPr>
-        <a:xfrm>
-          <a:off x="0" y="0"/>
-          <a:ext cx="0" cy="0"/>
-          <a:chOff x="0" y="0"/>
-          <a:chExt cx="0" cy="0"/>
-        </a:xfrm>
-      </p:grpSpPr>
-      <p:sp>
-        <p:nvSpPr>
-          <p:cNvPr id="2" name="Title 1"/>
-          <p:cNvSpPr>
-            <a:spLocks noGrp="1"/>
-          </p:cNvSpPr>
-          <p:nvPr>
-            <p:ph type="title"/>
-          </p:nvPr>
-        </p:nvSpPr>
-        <p:spPr/>
-        <p:txBody>
-          <a:bodyPr/>
-          <a:lstStyle/>
-          <a:p>
-            <a:r>
-              <a:rPr lang="en-US" dirty="0" smtClean="0"/>
-              <a:t>Step 1:</a:t>
-            </a:r>
-            <a:br>
-              <a:rPr lang="en-US" dirty="0" smtClean="0"/>
-            </a:br>
-            <a:r>
-              <a:rPr lang="en-US" dirty="0" smtClean="0"/>
-              <a:t>Exploratory analysis</a:t>
-            </a:r>
-            <a:endParaRPr lang="en-US" dirty="0"/>
-          </a:p>
-        </p:txBody>
-      </p:sp>
-      <p:sp>
-        <p:nvSpPr>
-          <p:cNvPr id="3" name="Content Placeholder 2"/>
-          <p:cNvSpPr>
-            <a:spLocks noGrp="1"/>
-          </p:cNvSpPr>
-          <p:nvPr>
-            <p:ph idx="1"/>
-          </p:nvPr>
-        </p:nvSpPr>
-        <p:spPr/>
-        <p:txBody>
-          <a:bodyPr/>
-          <a:lstStyle/>
-          <a:p>
-            <a:r>
-              <a:rPr lang="en-US" dirty="0"/>
-              <a:t>I</a:t>
-            </a:r>
-            <a:r>
-              <a:rPr lang="en-US" dirty="0" smtClean="0"/>
-              <a:t>nitial </a:t>
-            </a:r>
-            <a:r>
-              <a:rPr lang="en-US" dirty="0"/>
-              <a:t>exploratory analysis on the Guardian and the Independent sets of </a:t>
-            </a:r>
-            <a:r>
-              <a:rPr lang="en-US" dirty="0" smtClean="0"/>
-              <a:t>documents</a:t>
-            </a:r>
-          </a:p>
-          <a:p>
-            <a:pPr lvl="1"/>
-            <a:r>
-              <a:rPr lang="en-US" sz="1800" dirty="0" smtClean="0"/>
-              <a:t>looking </a:t>
-            </a:r>
-            <a:r>
-              <a:rPr lang="en-US" sz="1800" dirty="0"/>
-              <a:t>for long-lasting environmental issues rather than individual </a:t>
-            </a:r>
-            <a:r>
-              <a:rPr lang="en-US" sz="1800" dirty="0" smtClean="0"/>
-              <a:t>disasters</a:t>
-            </a:r>
-          </a:p>
-          <a:p>
-            <a:pPr lvl="2"/>
-            <a:r>
-              <a:rPr lang="en-US" sz="2000" dirty="0" smtClean="0"/>
-              <a:t>Observations</a:t>
-            </a:r>
-          </a:p>
-          <a:p>
-            <a:pPr lvl="3"/>
-            <a:r>
-              <a:rPr lang="en-US" dirty="0" smtClean="0"/>
-              <a:t>Using </a:t>
-            </a:r>
-            <a:r>
-              <a:rPr lang="en-US" dirty="0"/>
-              <a:t>newspapers </a:t>
-            </a:r>
-            <a:r>
-              <a:rPr lang="en-US" dirty="0" err="1"/>
-              <a:t>categorisation</a:t>
-            </a:r>
-            <a:r>
-              <a:rPr lang="en-US" dirty="0"/>
-              <a:t> and search for terms in </a:t>
-            </a:r>
-            <a:r>
-              <a:rPr lang="en-US" dirty="0" smtClean="0"/>
-              <a:t>titles, we’ve </a:t>
-            </a:r>
-            <a:r>
-              <a:rPr lang="en-US" dirty="0"/>
-              <a:t>established that the amount of news articles mentioning ‘air pollution’, ‘smog’ or ‘air quality’ in titles is low (range of few hundreds of articles in the set</a:t>
-            </a:r>
-            <a:r>
-              <a:rPr lang="en-US" dirty="0" smtClean="0"/>
-              <a:t>)</a:t>
-            </a:r>
-          </a:p>
-          <a:p>
-            <a:pPr lvl="3"/>
-            <a:r>
-              <a:rPr lang="en-US" dirty="0" smtClean="0"/>
-              <a:t>Using </a:t>
-            </a:r>
-            <a:r>
-              <a:rPr lang="en-US" dirty="0"/>
-              <a:t>newspapers </a:t>
-            </a:r>
-            <a:r>
-              <a:rPr lang="en-US" dirty="0" err="1"/>
-              <a:t>categorisation</a:t>
-            </a:r>
-            <a:r>
-              <a:rPr lang="en-US" dirty="0"/>
-              <a:t> (category ‘environment’), we’ve observed that although the size of sample differed considerably (the Guardian ~ 200k documents, the Independent ~1,300k documents) the number of documents tagged with ‘environment’ category was similar (~8-9k), possibly indicating difference in interest in the matter due to </a:t>
-            </a:r>
-            <a:r>
-              <a:rPr lang="en-US" dirty="0" smtClean="0"/>
-              <a:t>political </a:t>
-            </a:r>
-            <a:r>
-              <a:rPr lang="en-US" dirty="0"/>
-              <a:t>views.</a:t>
-            </a:r>
-            <a:endParaRPr lang="en-US" dirty="0"/>
-          </a:p>
-        </p:txBody>
-      </p:sp>
-    </p:spTree>
-    <p:extLst>
-      <p:ext uri="{BB962C8B-B14F-4D97-AF65-F5344CB8AC3E}">
-        <p14:creationId xmlns:p14="http://schemas.microsoft.com/office/powerpoint/2010/main" val="939290267"/>
-      </p:ext>
-    </p:extLst>
-  </p:cSld>
-  <p:clrMapOvr>
-    <a:masterClrMapping/>
-  </p:clrMapOvr>
-  <p:timing>
-    <p:tnLst>
-      <p:par>
-        <p:cTn id="1" dur="indefinite" restart="never" nodeType="tmRoot"/>
-      </p:par>
-    </p:tnLst>
-  </p:timing>
-</p:sld>
-</file>
-
-<file path=ppt/slides/slide4.xml><?xml version="1.0" encoding="utf-8"?>
-<p:sld xmlns:a="http://schemas.openxmlformats.org/drawingml/2006/main" xmlns:r="http://schemas.openxmlformats.org/officeDocument/2006/relationships" xmlns:p="http://schemas.openxmlformats.org/presentationml/2006/main">
-  <p:cSld>
-    <p:spTree>
-      <p:nvGrpSpPr>
-        <p:cNvPr id="1" name=""/>
-        <p:cNvGrpSpPr/>
-        <p:nvPr/>
-      </p:nvGrpSpPr>
-      <p:grpSpPr>
-        <a:xfrm>
-          <a:off x="0" y="0"/>
-          <a:ext cx="0" cy="0"/>
-          <a:chOff x="0" y="0"/>
-          <a:chExt cx="0" cy="0"/>
-        </a:xfrm>
-      </p:grpSpPr>
-      <p:sp>
-        <p:nvSpPr>
-          <p:cNvPr id="2" name="Title 1"/>
-          <p:cNvSpPr>
-            <a:spLocks noGrp="1"/>
-          </p:cNvSpPr>
-          <p:nvPr>
-            <p:ph type="title"/>
-          </p:nvPr>
-        </p:nvSpPr>
-        <p:spPr/>
-        <p:txBody>
-          <a:bodyPr/>
-          <a:lstStyle/>
-          <a:p>
-            <a:r>
-              <a:rPr lang="en-US" dirty="0" smtClean="0"/>
-              <a:t>Step 2:</a:t>
-            </a:r>
-            <a:br>
-              <a:rPr lang="en-US" dirty="0" smtClean="0"/>
-            </a:br>
-            <a:r>
-              <a:rPr lang="en-US" dirty="0" smtClean="0"/>
-              <a:t>Topic modelling</a:t>
-            </a:r>
-            <a:endParaRPr lang="en-US" dirty="0"/>
-          </a:p>
-        </p:txBody>
-      </p:sp>
-      <p:sp>
-        <p:nvSpPr>
-          <p:cNvPr id="3" name="Content Placeholder 2"/>
-          <p:cNvSpPr>
-            <a:spLocks noGrp="1"/>
-          </p:cNvSpPr>
-          <p:nvPr>
-            <p:ph idx="1"/>
-          </p:nvPr>
-        </p:nvSpPr>
-        <p:spPr/>
-        <p:txBody>
-          <a:bodyPr/>
-          <a:lstStyle/>
-          <a:p>
-            <a:r>
-              <a:rPr lang="en-US" dirty="0" smtClean="0"/>
-              <a:t>We performed LDA on the disaster-related news dataset</a:t>
-            </a:r>
-          </a:p>
-          <a:p>
-            <a:pPr lvl="1"/>
-            <a:r>
-              <a:rPr lang="en-US" sz="1800" dirty="0" smtClean="0"/>
-              <a:t>4 topic clusters are extracted, which contains keywords representing the topic</a:t>
-            </a:r>
-            <a:endParaRPr lang="en-US" sz="2000" b="1" i="1" u="sng" dirty="0">
-              <a:solidFill>
-                <a:srgbClr val="FF0000"/>
-              </a:solidFill>
-            </a:endParaRPr>
-          </a:p>
-        </p:txBody>
-      </p:sp>
-    </p:spTree>
-    <p:extLst>
-      <p:ext uri="{BB962C8B-B14F-4D97-AF65-F5344CB8AC3E}">
-        <p14:creationId xmlns:p14="http://schemas.microsoft.com/office/powerpoint/2010/main" val="291155767"/>
-      </p:ext>
-    </p:extLst>
-  </p:cSld>
-  <p:clrMapOvr>
-    <a:masterClrMapping/>
-  </p:clrMapOvr>
-  <p:timing>
-    <p:tnLst>
-      <p:par>
-        <p:cTn id="1" dur="indefinite" restart="never" nodeType="tmRoot"/>
-      </p:par>
-    </p:tnLst>
-  </p:timing>
-</p:sld>
-</file>
-
-<file path=ppt/slides/slide5.xml><?xml version="1.0" encoding="utf-8"?>
-<p:sld xmlns:a="http://schemas.openxmlformats.org/drawingml/2006/main" xmlns:r="http://schemas.openxmlformats.org/officeDocument/2006/relationships" xmlns:p="http://schemas.openxmlformats.org/presentationml/2006/main">
-  <p:cSld>
-    <p:spTree>
-      <p:nvGrpSpPr>
-        <p:cNvPr id="1" name=""/>
-        <p:cNvGrpSpPr/>
-        <p:nvPr/>
-      </p:nvGrpSpPr>
-      <p:grpSpPr>
-        <a:xfrm>
-          <a:off x="0" y="0"/>
-          <a:ext cx="0" cy="0"/>
-          <a:chOff x="0" y="0"/>
-          <a:chExt cx="0" cy="0"/>
-        </a:xfrm>
-      </p:grpSpPr>
-      <p:sp>
-        <p:nvSpPr>
-          <p:cNvPr id="2" name="Title 1"/>
-          <p:cNvSpPr>
-            <a:spLocks noGrp="1"/>
-          </p:cNvSpPr>
-          <p:nvPr>
-            <p:ph type="title"/>
-          </p:nvPr>
-        </p:nvSpPr>
-        <p:spPr/>
-        <p:txBody>
-          <a:bodyPr/>
-          <a:lstStyle/>
-          <a:p>
-            <a:r>
-              <a:rPr lang="en-US" dirty="0" smtClean="0"/>
-              <a:t>Step 3:</a:t>
-            </a:r>
-            <a:br>
-              <a:rPr lang="en-US" dirty="0" smtClean="0"/>
-            </a:br>
-            <a:r>
-              <a:rPr lang="en-US" dirty="0" smtClean="0"/>
-              <a:t>Sentiment analysis</a:t>
-            </a:r>
-            <a:endParaRPr lang="en-US" dirty="0"/>
-          </a:p>
-        </p:txBody>
-      </p:sp>
-      <p:sp>
-        <p:nvSpPr>
-          <p:cNvPr id="3" name="Content Placeholder 2"/>
-          <p:cNvSpPr>
-            <a:spLocks noGrp="1"/>
-          </p:cNvSpPr>
-          <p:nvPr>
-            <p:ph idx="1"/>
-          </p:nvPr>
-        </p:nvSpPr>
-        <p:spPr/>
-        <p:txBody>
-          <a:bodyPr/>
-          <a:lstStyle/>
-          <a:p>
-            <a:r>
-              <a:rPr lang="en-US" dirty="0" smtClean="0"/>
-              <a:t>We performed sentiment analysis on the disaster-related news</a:t>
-            </a:r>
-          </a:p>
-          <a:p>
-            <a:pPr lvl="1"/>
-            <a:r>
-              <a:rPr lang="en-US" dirty="0" smtClean="0"/>
-              <a:t>Sentiment word count-based sentiment analysis: we assume that the positive word contributes to the sentiment as +1 while the negative word does as -1</a:t>
-            </a:r>
-          </a:p>
-          <a:p>
-            <a:pPr lvl="1"/>
-            <a:r>
-              <a:rPr lang="en-US" dirty="0" smtClean="0"/>
-              <a:t>After counting sentiment words, we normalize the score by the total number of words in each filtered-news dataset</a:t>
-            </a:r>
-          </a:p>
-          <a:p>
-            <a:pPr lvl="1"/>
-            <a:r>
-              <a:rPr lang="en-US" dirty="0" smtClean="0"/>
-              <a:t>We borrow the sentiment lexicon by (Liu et al. 2004)</a:t>
-            </a:r>
-          </a:p>
-          <a:p>
-            <a:pPr lvl="2"/>
-            <a:endParaRPr lang="en-US" dirty="0" smtClean="0"/>
-          </a:p>
-        </p:txBody>
-      </p:sp>
-    </p:spTree>
-    <p:extLst>
-      <p:ext uri="{BB962C8B-B14F-4D97-AF65-F5344CB8AC3E}">
-        <p14:creationId xmlns:p14="http://schemas.microsoft.com/office/powerpoint/2010/main" val="1287375549"/>
-      </p:ext>
-    </p:extLst>
-  </p:cSld>
-  <p:clrMapOvr>
-    <a:masterClrMapping/>
-  </p:clrMapOvr>
-  <p:timing>
-    <p:tnLst>
-      <p:par>
-        <p:cTn id="1" dur="indefinite" restart="never" nodeType="tmRoot"/>
-      </p:par>
-    </p:tnLst>
-  </p:timing>
-</p:sld>
-</file>
-
-<file path=ppt/slides/slide6.xml><?xml version="1.0" encoding="utf-8"?>
-<p:sld xmlns:a="http://schemas.openxmlformats.org/drawingml/2006/main" xmlns:r="http://schemas.openxmlformats.org/officeDocument/2006/relationships" xmlns:p="http://schemas.openxmlformats.org/presentationml/2006/main">
-  <p:cSld>
-    <p:spTree>
-      <p:nvGrpSpPr>
-        <p:cNvPr id="1" name=""/>
-        <p:cNvGrpSpPr/>
-        <p:nvPr/>
-      </p:nvGrpSpPr>
-      <p:grpSpPr>
-        <a:xfrm>
-          <a:off x="0" y="0"/>
-          <a:ext cx="0" cy="0"/>
-          <a:chOff x="0" y="0"/>
-          <a:chExt cx="0" cy="0"/>
-        </a:xfrm>
-      </p:grpSpPr>
-      <p:sp>
-        <p:nvSpPr>
-          <p:cNvPr id="2" name="Title 1"/>
-          <p:cNvSpPr>
-            <a:spLocks noGrp="1"/>
-          </p:cNvSpPr>
-          <p:nvPr>
-            <p:ph type="title"/>
-          </p:nvPr>
-        </p:nvSpPr>
-        <p:spPr/>
-        <p:txBody>
-          <a:bodyPr/>
-          <a:lstStyle/>
-          <a:p>
-            <a:r>
-              <a:rPr lang="en-US" dirty="0" smtClean="0"/>
-              <a:t>Demonstration</a:t>
-            </a:r>
-            <a:endParaRPr lang="en-US" dirty="0"/>
-          </a:p>
-        </p:txBody>
-      </p:sp>
-      <p:sp>
-        <p:nvSpPr>
-          <p:cNvPr id="3" name="Content Placeholder 2"/>
-          <p:cNvSpPr>
-            <a:spLocks noGrp="1"/>
-          </p:cNvSpPr>
-          <p:nvPr>
-            <p:ph idx="1"/>
-          </p:nvPr>
-        </p:nvSpPr>
-        <p:spPr/>
-        <p:txBody>
-          <a:bodyPr/>
-          <a:lstStyle/>
-          <a:p>
-            <a:r>
-              <a:rPr lang="en-US" dirty="0" smtClean="0"/>
-              <a:t>Demo web: </a:t>
-            </a:r>
-          </a:p>
-          <a:p>
-            <a:endParaRPr lang="en-US" dirty="0"/>
-          </a:p>
-          <a:p>
-            <a:r>
-              <a:rPr lang="en-US" dirty="0" err="1" smtClean="0"/>
-              <a:t>Github</a:t>
-            </a:r>
-            <a:r>
-              <a:rPr lang="en-US" dirty="0" smtClean="0"/>
-              <a:t>:</a:t>
-            </a:r>
-          </a:p>
-          <a:p>
-            <a:endParaRPr lang="en-US" dirty="0" smtClean="0"/>
-          </a:p>
-        </p:txBody>
-      </p:sp>
-    </p:spTree>
-    <p:extLst>
-      <p:ext uri="{BB962C8B-B14F-4D97-AF65-F5344CB8AC3E}">
-        <p14:creationId xmlns:p14="http://schemas.microsoft.com/office/powerpoint/2010/main" val="863833395"/>
-      </p:ext>
-    </p:extLst>
-  </p:cSld>
-  <p:clrMapOvr>
-    <a:masterClrMapping/>
-  </p:clrMapOvr>
-  <p:timing>
-    <p:tnLst>
-      <p:par>
-        <p:cTn id="1" dur="indefinite" restart="never" nodeType="tmRoot"/>
-      </p:par>
-    </p:tnLst>
-  </p:timing>
-</p:sld>
-</file>
-
-<file path=ppt/slides/slide7.xml><?xml version="1.0" encoding="utf-8"?>
-<p:sld xmlns:a="http://schemas.openxmlformats.org/drawingml/2006/main" xmlns:r="http://schemas.openxmlformats.org/officeDocument/2006/relationships" xmlns:p="http://schemas.openxmlformats.org/presentationml/2006/main">
-  <p:cSld>
-    <p:spTree>
-      <p:nvGrpSpPr>
-        <p:cNvPr id="1" name=""/>
-        <p:cNvGrpSpPr/>
-        <p:nvPr/>
-      </p:nvGrpSpPr>
-      <p:grpSpPr>
-        <a:xfrm>
-          <a:off x="0" y="0"/>
-          <a:ext cx="0" cy="0"/>
-          <a:chOff x="0" y="0"/>
-          <a:chExt cx="0" cy="0"/>
-        </a:xfrm>
-      </p:grpSpPr>
-      <p:sp>
-        <p:nvSpPr>
-          <p:cNvPr id="2" name="Title 1"/>
-          <p:cNvSpPr>
-            <a:spLocks noGrp="1"/>
-          </p:cNvSpPr>
-          <p:nvPr>
-            <p:ph type="title"/>
-          </p:nvPr>
-        </p:nvSpPr>
-        <p:spPr/>
-        <p:txBody>
-          <a:bodyPr/>
-          <a:lstStyle/>
-          <a:p>
-            <a:endParaRPr lang="en-US" dirty="0"/>
-          </a:p>
-        </p:txBody>
-      </p:sp>
-      <p:sp>
-        <p:nvSpPr>
-          <p:cNvPr id="3" name="Content Placeholder 2"/>
-          <p:cNvSpPr>
-            <a:spLocks noGrp="1"/>
-          </p:cNvSpPr>
-          <p:nvPr>
-            <p:ph idx="1"/>
-          </p:nvPr>
-        </p:nvSpPr>
-        <p:spPr/>
-        <p:txBody>
-          <a:bodyPr>
-            <a:normAutofit/>
-          </a:bodyPr>
-          <a:lstStyle/>
-          <a:p>
-            <a:pPr marL="0" indent="0" algn="ctr">
-              <a:buNone/>
-            </a:pPr>
-            <a:r>
-              <a:rPr lang="en-US" sz="6600" dirty="0" smtClean="0"/>
-              <a:t>Thank You!</a:t>
-            </a:r>
-            <a:endParaRPr lang="en-US" sz="6600" dirty="0"/>
-          </a:p>
-        </p:txBody>
-      </p:sp>
-    </p:spTree>
-    <p:extLst>
-      <p:ext uri="{BB962C8B-B14F-4D97-AF65-F5344CB8AC3E}">
-        <p14:creationId xmlns:p14="http://schemas.microsoft.com/office/powerpoint/2010/main" val="456564648"/>
       </p:ext>
     </p:extLst>
   </p:cSld>

</xml_diff>